<commit_message>
Small refactor to files in memory + insert image in pptx question (still not done)
</commit_message>
<xml_diff>
--- a/Tests/Files/Presentation1.pptx
+++ b/Tests/Files/Presentation1.pptx
@@ -7,6 +7,7 @@
   <p:sldIdLst>
     <p:sldId id="256" r:id="rId2"/>
     <p:sldId id="257" r:id="rId3"/>
+    <p:sldId id="258" r:id="rId4"/>
   </p:sldIdLst>
   <p:sldSz cx="12192000" cy="6858000"/>
   <p:notesSz cx="6858000" cy="9144000"/>
@@ -252,7 +253,7 @@
           <a:p>
             <a:fld id="{846CE7D5-CF57-46EF-B807-FDD0502418D4}" type="datetimeFigureOut">
               <a:rPr lang="en-US" smtClean="0"/>
-              <a:t>12/15/2024</a:t>
+              <a:t>12/28/2024</a:t>
             </a:fld>
             <a:endParaRPr lang="en-US"/>
           </a:p>
@@ -422,7 +423,7 @@
           <a:p>
             <a:fld id="{846CE7D5-CF57-46EF-B807-FDD0502418D4}" type="datetimeFigureOut">
               <a:rPr lang="en-US" smtClean="0"/>
-              <a:t>12/15/2024</a:t>
+              <a:t>12/28/2024</a:t>
             </a:fld>
             <a:endParaRPr lang="en-US"/>
           </a:p>
@@ -602,7 +603,7 @@
           <a:p>
             <a:fld id="{846CE7D5-CF57-46EF-B807-FDD0502418D4}" type="datetimeFigureOut">
               <a:rPr lang="en-US" smtClean="0"/>
-              <a:t>12/15/2024</a:t>
+              <a:t>12/28/2024</a:t>
             </a:fld>
             <a:endParaRPr lang="en-US"/>
           </a:p>
@@ -772,7 +773,7 @@
           <a:p>
             <a:fld id="{846CE7D5-CF57-46EF-B807-FDD0502418D4}" type="datetimeFigureOut">
               <a:rPr lang="en-US" smtClean="0"/>
-              <a:t>12/15/2024</a:t>
+              <a:t>12/28/2024</a:t>
             </a:fld>
             <a:endParaRPr lang="en-US"/>
           </a:p>
@@ -1018,7 +1019,7 @@
           <a:p>
             <a:fld id="{846CE7D5-CF57-46EF-B807-FDD0502418D4}" type="datetimeFigureOut">
               <a:rPr lang="en-US" smtClean="0"/>
-              <a:t>12/15/2024</a:t>
+              <a:t>12/28/2024</a:t>
             </a:fld>
             <a:endParaRPr lang="en-US"/>
           </a:p>
@@ -1250,7 +1251,7 @@
           <a:p>
             <a:fld id="{846CE7D5-CF57-46EF-B807-FDD0502418D4}" type="datetimeFigureOut">
               <a:rPr lang="en-US" smtClean="0"/>
-              <a:t>12/15/2024</a:t>
+              <a:t>12/28/2024</a:t>
             </a:fld>
             <a:endParaRPr lang="en-US"/>
           </a:p>
@@ -1617,7 +1618,7 @@
           <a:p>
             <a:fld id="{846CE7D5-CF57-46EF-B807-FDD0502418D4}" type="datetimeFigureOut">
               <a:rPr lang="en-US" smtClean="0"/>
-              <a:t>12/15/2024</a:t>
+              <a:t>12/28/2024</a:t>
             </a:fld>
             <a:endParaRPr lang="en-US"/>
           </a:p>
@@ -1735,7 +1736,7 @@
           <a:p>
             <a:fld id="{846CE7D5-CF57-46EF-B807-FDD0502418D4}" type="datetimeFigureOut">
               <a:rPr lang="en-US" smtClean="0"/>
-              <a:t>12/15/2024</a:t>
+              <a:t>12/28/2024</a:t>
             </a:fld>
             <a:endParaRPr lang="en-US"/>
           </a:p>
@@ -1830,7 +1831,7 @@
           <a:p>
             <a:fld id="{846CE7D5-CF57-46EF-B807-FDD0502418D4}" type="datetimeFigureOut">
               <a:rPr lang="en-US" smtClean="0"/>
-              <a:t>12/15/2024</a:t>
+              <a:t>12/28/2024</a:t>
             </a:fld>
             <a:endParaRPr lang="en-US"/>
           </a:p>
@@ -2107,7 +2108,7 @@
           <a:p>
             <a:fld id="{846CE7D5-CF57-46EF-B807-FDD0502418D4}" type="datetimeFigureOut">
               <a:rPr lang="en-US" smtClean="0"/>
-              <a:t>12/15/2024</a:t>
+              <a:t>12/28/2024</a:t>
             </a:fld>
             <a:endParaRPr lang="en-US"/>
           </a:p>
@@ -2364,7 +2365,7 @@
           <a:p>
             <a:fld id="{846CE7D5-CF57-46EF-B807-FDD0502418D4}" type="datetimeFigureOut">
               <a:rPr lang="en-US" smtClean="0"/>
-              <a:t>12/15/2024</a:t>
+              <a:t>12/28/2024</a:t>
             </a:fld>
             <a:endParaRPr lang="en-US"/>
           </a:p>
@@ -2577,7 +2578,7 @@
           <a:p>
             <a:fld id="{846CE7D5-CF57-46EF-B807-FDD0502418D4}" type="datetimeFigureOut">
               <a:rPr lang="en-US" smtClean="0"/>
-              <a:t>12/15/2024</a:t>
+              <a:t>12/28/2024</a:t>
             </a:fld>
             <a:endParaRPr lang="en-US"/>
           </a:p>
@@ -3022,10 +3023,10 @@
       </p:sp>
       <p:pic>
         <p:nvPicPr>
-          <p:cNvPr id="4" name="Picture 3" descr="A dark hallway with red carpet&#10;&#10;Description automatically generated">
+          <p:cNvPr id="6" name="Picture 5" descr="A dark hallway with red carpet&#10;&#10;Description automatically generated">
             <a:extLst>
               <a:ext uri="{FF2B5EF4-FFF2-40B4-BE49-F238E27FC236}">
-                <a16:creationId xmlns:a16="http://schemas.microsoft.com/office/drawing/2014/main" id="{09AC9D54-D153-D88C-9099-D0E15C6281EC}"/>
+                <a16:creationId xmlns:a16="http://schemas.microsoft.com/office/drawing/2014/main" id="{50E43AF3-751E-CFC4-0422-89B853009F3F}"/>
               </a:ext>
             </a:extLst>
           </p:cNvPr>
@@ -3035,15 +3036,21 @@
           <p:nvPr/>
         </p:nvPicPr>
         <p:blipFill>
-          <a:blip r:embed="rId2"/>
+          <a:blip r:embed="rId2" cstate="print">
+            <a:extLst>
+              <a:ext uri="{28A0092B-C50C-407E-A947-70E740481C1C}">
+                <a14:useLocalDpi xmlns:a14="http://schemas.microsoft.com/office/drawing/2010/main" val="0"/>
+              </a:ext>
+            </a:extLst>
+          </a:blip>
           <a:stretch>
             <a:fillRect/>
           </a:stretch>
         </p:blipFill>
         <p:spPr>
           <a:xfrm>
-            <a:off x="2536209" y="895634"/>
-            <a:ext cx="7756477" cy="4361597"/>
+            <a:off x="3332480" y="243840"/>
+            <a:ext cx="8561493" cy="4815840"/>
           </a:xfrm>
           <a:prstGeom prst="rect">
             <a:avLst/>
@@ -3138,6 +3145,96 @@
     <p:extLst>
       <p:ext uri="{BB962C8B-B14F-4D97-AF65-F5344CB8AC3E}">
         <p14:creationId xmlns:p14="http://schemas.microsoft.com/office/powerpoint/2010/main" val="3232970614"/>
+      </p:ext>
+    </p:extLst>
+  </p:cSld>
+  <p:clrMapOvr>
+    <a:masterClrMapping/>
+  </p:clrMapOvr>
+</p:sld>
+</file>
+
+<file path=ppt/slides/slide3.xml><?xml version="1.0" encoding="utf-8"?>
+<p:sld xmlns:a="http://schemas.openxmlformats.org/drawingml/2006/main" xmlns:r="http://schemas.openxmlformats.org/officeDocument/2006/relationships" xmlns:p="http://schemas.openxmlformats.org/presentationml/2006/main">
+  <p:cSld>
+    <p:spTree>
+      <p:nvGrpSpPr>
+        <p:cNvPr id="1" name=""/>
+        <p:cNvGrpSpPr/>
+        <p:nvPr/>
+      </p:nvGrpSpPr>
+      <p:grpSpPr>
+        <a:xfrm>
+          <a:off x="0" y="0"/>
+          <a:ext cx="0" cy="0"/>
+          <a:chOff x="0" y="0"/>
+          <a:chExt cx="0" cy="0"/>
+        </a:xfrm>
+      </p:grpSpPr>
+      <p:sp>
+        <p:nvSpPr>
+          <p:cNvPr id="2" name="Title 1">
+            <a:extLst>
+              <a:ext uri="{FF2B5EF4-FFF2-40B4-BE49-F238E27FC236}">
+                <a16:creationId xmlns:a16="http://schemas.microsoft.com/office/drawing/2014/main" id="{64886C77-7B45-DE67-F129-96115581FC98}"/>
+              </a:ext>
+            </a:extLst>
+          </p:cNvPr>
+          <p:cNvSpPr>
+            <a:spLocks noGrp="1"/>
+          </p:cNvSpPr>
+          <p:nvPr>
+            <p:ph type="title"/>
+          </p:nvPr>
+        </p:nvSpPr>
+        <p:spPr/>
+        <p:txBody>
+          <a:bodyPr/>
+          <a:lstStyle/>
+          <a:p>
+            <a:endParaRPr lang="it-IT"/>
+          </a:p>
+        </p:txBody>
+      </p:sp>
+      <p:pic>
+        <p:nvPicPr>
+          <p:cNvPr id="7" name="Content Placeholder 6" descr="A road with a circle in the sky&#10;&#10;Description automatically generated">
+            <a:extLst>
+              <a:ext uri="{FF2B5EF4-FFF2-40B4-BE49-F238E27FC236}">
+                <a16:creationId xmlns:a16="http://schemas.microsoft.com/office/drawing/2014/main" id="{006E4DE5-0165-EA16-F788-3B35511B84A7}"/>
+              </a:ext>
+            </a:extLst>
+          </p:cNvPr>
+          <p:cNvPicPr>
+            <a:picLocks noGrp="1" noChangeAspect="1"/>
+          </p:cNvPicPr>
+          <p:nvPr>
+            <p:ph idx="1"/>
+          </p:nvPr>
+        </p:nvPicPr>
+        <p:blipFill>
+          <a:blip r:embed="rId2" cstate="print">
+            <a:extLst>
+              <a:ext uri="{28A0092B-C50C-407E-A947-70E740481C1C}">
+                <a14:useLocalDpi xmlns:a14="http://schemas.microsoft.com/office/drawing/2010/main" val="0"/>
+              </a:ext>
+            </a:extLst>
+          </a:blip>
+          <a:stretch>
+            <a:fillRect/>
+          </a:stretch>
+        </p:blipFill>
+        <p:spPr>
+          <a:xfrm>
+            <a:off x="1104706" y="2140476"/>
+            <a:ext cx="5857627" cy="3294915"/>
+          </a:xfrm>
+        </p:spPr>
+      </p:pic>
+    </p:spTree>
+    <p:extLst>
+      <p:ext uri="{BB962C8B-B14F-4D97-AF65-F5344CB8AC3E}">
+        <p14:creationId xmlns:p14="http://schemas.microsoft.com/office/powerpoint/2010/main" val="1113331188"/>
       </p:ext>
     </p:extLst>
   </p:cSld>

</xml_diff>

<commit_message>
Generalised PowerPoint question to generic Shapes + rotation and flip values
</commit_message>
<xml_diff>
--- a/Tests/Files/Presentation1.pptx
+++ b/Tests/Files/Presentation1.pptx
@@ -253,7 +253,7 @@
           <a:p>
             <a:fld id="{846CE7D5-CF57-46EF-B807-FDD0502418D4}" type="datetimeFigureOut">
               <a:rPr lang="en-US" smtClean="0"/>
-              <a:t>12/28/2024</a:t>
+              <a:t>1/5/2025</a:t>
             </a:fld>
             <a:endParaRPr lang="en-US"/>
           </a:p>
@@ -295,7 +295,7 @@
           <a:p>
             <a:fld id="{330EA680-D336-4FF7-8B7A-9848BB0A1C32}" type="slidenum">
               <a:rPr lang="en-US" smtClean="0"/>
-              <a:t>‹#›</a:t>
+              <a:t>‹N›</a:t>
             </a:fld>
             <a:endParaRPr lang="en-US"/>
           </a:p>
@@ -423,7 +423,7 @@
           <a:p>
             <a:fld id="{846CE7D5-CF57-46EF-B807-FDD0502418D4}" type="datetimeFigureOut">
               <a:rPr lang="en-US" smtClean="0"/>
-              <a:t>12/28/2024</a:t>
+              <a:t>1/5/2025</a:t>
             </a:fld>
             <a:endParaRPr lang="en-US"/>
           </a:p>
@@ -465,7 +465,7 @@
           <a:p>
             <a:fld id="{330EA680-D336-4FF7-8B7A-9848BB0A1C32}" type="slidenum">
               <a:rPr lang="en-US" smtClean="0"/>
-              <a:t>‹#›</a:t>
+              <a:t>‹N›</a:t>
             </a:fld>
             <a:endParaRPr lang="en-US"/>
           </a:p>
@@ -603,7 +603,7 @@
           <a:p>
             <a:fld id="{846CE7D5-CF57-46EF-B807-FDD0502418D4}" type="datetimeFigureOut">
               <a:rPr lang="en-US" smtClean="0"/>
-              <a:t>12/28/2024</a:t>
+              <a:t>1/5/2025</a:t>
             </a:fld>
             <a:endParaRPr lang="en-US"/>
           </a:p>
@@ -645,7 +645,7 @@
           <a:p>
             <a:fld id="{330EA680-D336-4FF7-8B7A-9848BB0A1C32}" type="slidenum">
               <a:rPr lang="en-US" smtClean="0"/>
-              <a:t>‹#›</a:t>
+              <a:t>‹N›</a:t>
             </a:fld>
             <a:endParaRPr lang="en-US"/>
           </a:p>
@@ -773,7 +773,7 @@
           <a:p>
             <a:fld id="{846CE7D5-CF57-46EF-B807-FDD0502418D4}" type="datetimeFigureOut">
               <a:rPr lang="en-US" smtClean="0"/>
-              <a:t>12/28/2024</a:t>
+              <a:t>1/5/2025</a:t>
             </a:fld>
             <a:endParaRPr lang="en-US"/>
           </a:p>
@@ -815,7 +815,7 @@
           <a:p>
             <a:fld id="{330EA680-D336-4FF7-8B7A-9848BB0A1C32}" type="slidenum">
               <a:rPr lang="en-US" smtClean="0"/>
-              <a:t>‹#›</a:t>
+              <a:t>‹N›</a:t>
             </a:fld>
             <a:endParaRPr lang="en-US"/>
           </a:p>
@@ -1019,7 +1019,7 @@
           <a:p>
             <a:fld id="{846CE7D5-CF57-46EF-B807-FDD0502418D4}" type="datetimeFigureOut">
               <a:rPr lang="en-US" smtClean="0"/>
-              <a:t>12/28/2024</a:t>
+              <a:t>1/5/2025</a:t>
             </a:fld>
             <a:endParaRPr lang="en-US"/>
           </a:p>
@@ -1061,7 +1061,7 @@
           <a:p>
             <a:fld id="{330EA680-D336-4FF7-8B7A-9848BB0A1C32}" type="slidenum">
               <a:rPr lang="en-US" smtClean="0"/>
-              <a:t>‹#›</a:t>
+              <a:t>‹N›</a:t>
             </a:fld>
             <a:endParaRPr lang="en-US"/>
           </a:p>
@@ -1251,7 +1251,7 @@
           <a:p>
             <a:fld id="{846CE7D5-CF57-46EF-B807-FDD0502418D4}" type="datetimeFigureOut">
               <a:rPr lang="en-US" smtClean="0"/>
-              <a:t>12/28/2024</a:t>
+              <a:t>1/5/2025</a:t>
             </a:fld>
             <a:endParaRPr lang="en-US"/>
           </a:p>
@@ -1293,7 +1293,7 @@
           <a:p>
             <a:fld id="{330EA680-D336-4FF7-8B7A-9848BB0A1C32}" type="slidenum">
               <a:rPr lang="en-US" smtClean="0"/>
-              <a:t>‹#›</a:t>
+              <a:t>‹N›</a:t>
             </a:fld>
             <a:endParaRPr lang="en-US"/>
           </a:p>
@@ -1618,7 +1618,7 @@
           <a:p>
             <a:fld id="{846CE7D5-CF57-46EF-B807-FDD0502418D4}" type="datetimeFigureOut">
               <a:rPr lang="en-US" smtClean="0"/>
-              <a:t>12/28/2024</a:t>
+              <a:t>1/5/2025</a:t>
             </a:fld>
             <a:endParaRPr lang="en-US"/>
           </a:p>
@@ -1660,7 +1660,7 @@
           <a:p>
             <a:fld id="{330EA680-D336-4FF7-8B7A-9848BB0A1C32}" type="slidenum">
               <a:rPr lang="en-US" smtClean="0"/>
-              <a:t>‹#›</a:t>
+              <a:t>‹N›</a:t>
             </a:fld>
             <a:endParaRPr lang="en-US"/>
           </a:p>
@@ -1736,7 +1736,7 @@
           <a:p>
             <a:fld id="{846CE7D5-CF57-46EF-B807-FDD0502418D4}" type="datetimeFigureOut">
               <a:rPr lang="en-US" smtClean="0"/>
-              <a:t>12/28/2024</a:t>
+              <a:t>1/5/2025</a:t>
             </a:fld>
             <a:endParaRPr lang="en-US"/>
           </a:p>
@@ -1778,7 +1778,7 @@
           <a:p>
             <a:fld id="{330EA680-D336-4FF7-8B7A-9848BB0A1C32}" type="slidenum">
               <a:rPr lang="en-US" smtClean="0"/>
-              <a:t>‹#›</a:t>
+              <a:t>‹N›</a:t>
             </a:fld>
             <a:endParaRPr lang="en-US"/>
           </a:p>
@@ -1831,7 +1831,7 @@
           <a:p>
             <a:fld id="{846CE7D5-CF57-46EF-B807-FDD0502418D4}" type="datetimeFigureOut">
               <a:rPr lang="en-US" smtClean="0"/>
-              <a:t>12/28/2024</a:t>
+              <a:t>1/5/2025</a:t>
             </a:fld>
             <a:endParaRPr lang="en-US"/>
           </a:p>
@@ -1873,7 +1873,7 @@
           <a:p>
             <a:fld id="{330EA680-D336-4FF7-8B7A-9848BB0A1C32}" type="slidenum">
               <a:rPr lang="en-US" smtClean="0"/>
-              <a:t>‹#›</a:t>
+              <a:t>‹N›</a:t>
             </a:fld>
             <a:endParaRPr lang="en-US"/>
           </a:p>
@@ -2108,7 +2108,7 @@
           <a:p>
             <a:fld id="{846CE7D5-CF57-46EF-B807-FDD0502418D4}" type="datetimeFigureOut">
               <a:rPr lang="en-US" smtClean="0"/>
-              <a:t>12/28/2024</a:t>
+              <a:t>1/5/2025</a:t>
             </a:fld>
             <a:endParaRPr lang="en-US"/>
           </a:p>
@@ -2150,7 +2150,7 @@
           <a:p>
             <a:fld id="{330EA680-D336-4FF7-8B7A-9848BB0A1C32}" type="slidenum">
               <a:rPr lang="en-US" smtClean="0"/>
-              <a:t>‹#›</a:t>
+              <a:t>‹N›</a:t>
             </a:fld>
             <a:endParaRPr lang="en-US"/>
           </a:p>
@@ -2365,7 +2365,7 @@
           <a:p>
             <a:fld id="{846CE7D5-CF57-46EF-B807-FDD0502418D4}" type="datetimeFigureOut">
               <a:rPr lang="en-US" smtClean="0"/>
-              <a:t>12/28/2024</a:t>
+              <a:t>1/5/2025</a:t>
             </a:fld>
             <a:endParaRPr lang="en-US"/>
           </a:p>
@@ -2407,7 +2407,7 @@
           <a:p>
             <a:fld id="{330EA680-D336-4FF7-8B7A-9848BB0A1C32}" type="slidenum">
               <a:rPr lang="en-US" smtClean="0"/>
-              <a:t>‹#›</a:t>
+              <a:t>‹N›</a:t>
             </a:fld>
             <a:endParaRPr lang="en-US"/>
           </a:p>
@@ -2578,7 +2578,7 @@
           <a:p>
             <a:fld id="{846CE7D5-CF57-46EF-B807-FDD0502418D4}" type="datetimeFigureOut">
               <a:rPr lang="en-US" smtClean="0"/>
-              <a:t>12/28/2024</a:t>
+              <a:t>1/5/2025</a:t>
             </a:fld>
             <a:endParaRPr lang="en-US"/>
           </a:p>
@@ -2656,7 +2656,7 @@
           <a:p>
             <a:fld id="{330EA680-D336-4FF7-8B7A-9848BB0A1C32}" type="slidenum">
               <a:rPr lang="en-US" smtClean="0"/>
-              <a:t>‹#›</a:t>
+              <a:t>‹N›</a:t>
             </a:fld>
             <a:endParaRPr lang="en-US"/>
           </a:p>
@@ -3017,7 +3017,7 @@
           <a:bodyPr/>
           <a:lstStyle/>
           <a:p>
-            <a:endParaRPr lang="en-US"/>
+            <a:endParaRPr lang="en-US" dirty="0"/>
           </a:p>
         </p:txBody>
       </p:sp>
@@ -3051,6 +3051,93 @@
           <a:xfrm>
             <a:off x="4246880" y="304800"/>
             <a:ext cx="7748693" cy="4358640"/>
+          </a:xfrm>
+          <a:prstGeom prst="rect">
+            <a:avLst/>
+          </a:prstGeom>
+          <a:noFill/>
+        </p:spPr>
+      </p:pic>
+      <p:sp>
+        <p:nvSpPr>
+          <p:cNvPr id="4" name="Circle: Hollow 3">
+            <a:extLst>
+              <a:ext uri="{FF2B5EF4-FFF2-40B4-BE49-F238E27FC236}">
+                <a16:creationId xmlns:a16="http://schemas.microsoft.com/office/drawing/2014/main" id="{B47208FA-57B0-EE22-5C39-F9E007536578}"/>
+              </a:ext>
+            </a:extLst>
+          </p:cNvPr>
+          <p:cNvSpPr/>
+          <p:nvPr/>
+        </p:nvSpPr>
+        <p:spPr>
+          <a:xfrm rot="600000" flipV="1">
+            <a:off x="1193801" y="4148666"/>
+            <a:ext cx="1862666" cy="2065867"/>
+          </a:xfrm>
+          <a:prstGeom prst="donut">
+            <a:avLst/>
+          </a:prstGeom>
+        </p:spPr>
+        <p:style>
+          <a:lnRef idx="2">
+            <a:schemeClr val="accent1">
+              <a:shade val="15000"/>
+            </a:schemeClr>
+          </a:lnRef>
+          <a:fillRef idx="1">
+            <a:schemeClr val="accent1"/>
+          </a:fillRef>
+          <a:effectRef idx="0">
+            <a:schemeClr val="accent1"/>
+          </a:effectRef>
+          <a:fontRef idx="minor">
+            <a:schemeClr val="lt1"/>
+          </a:fontRef>
+        </p:style>
+        <p:txBody>
+          <a:bodyPr rtlCol="0" anchor="ctr"/>
+          <a:lstStyle/>
+          <a:p>
+            <a:pPr algn="ctr"/>
+            <a:endParaRPr lang="it-IT">
+              <a:solidFill>
+                <a:schemeClr val="tx1"/>
+              </a:solidFill>
+            </a:endParaRPr>
+          </a:p>
+        </p:txBody>
+      </p:sp>
+      <p:pic>
+        <p:nvPicPr>
+          <p:cNvPr id="7" name="Graphic 6" descr="Abacus with solid fill">
+            <a:extLst>
+              <a:ext uri="{FF2B5EF4-FFF2-40B4-BE49-F238E27FC236}">
+                <a16:creationId xmlns:a16="http://schemas.microsoft.com/office/drawing/2014/main" id="{1C407D40-8A1E-5FA7-3106-BE25A2FC688A}"/>
+              </a:ext>
+            </a:extLst>
+          </p:cNvPr>
+          <p:cNvPicPr>
+            <a:picLocks noChangeAspect="1"/>
+          </p:cNvPicPr>
+          <p:nvPr/>
+        </p:nvPicPr>
+        <p:blipFill>
+          <a:blip r:embed="rId3">
+            <a:extLst>
+              <a:ext uri="{96DAC541-7B7A-43D3-8B79-37D633B846F1}">
+                <asvg:svgBlip xmlns:asvg="http://schemas.microsoft.com/office/drawing/2016/SVG/main" r:embed="rId4"/>
+              </a:ext>
+            </a:extLst>
+          </a:blip>
+          <a:stretch>
+            <a:fillRect/>
+          </a:stretch>
+        </p:blipFill>
+        <p:spPr>
+          <a:xfrm>
+            <a:off x="804333" y="400317"/>
+            <a:ext cx="914400" cy="914400"/>
           </a:xfrm>
           <a:prstGeom prst="rect">
             <a:avLst/>
@@ -3225,8 +3312,8 @@
           </a:stretch>
         </p:blipFill>
         <p:spPr>
-          <a:xfrm>
-            <a:off x="1104706" y="2140476"/>
+          <a:xfrm flipV="1">
+            <a:off x="1604060" y="2266936"/>
             <a:ext cx="5857627" cy="3294915"/>
           </a:xfrm>
         </p:spPr>

</xml_diff>